<commit_message>
change the pictures on the slides and updating the book
</commit_message>
<xml_diff>
--- a/Project Submission/Presentation/INTRO slides.pptx
+++ b/Project Submission/Presentation/INTRO slides.pptx
@@ -105,6 +105,11 @@
       </a:defRPr>
     </a:lvl9pPr>
   </p:defaultTextStyle>
+  <p:extLst>
+    <p:ext uri="{EFAFB233-063F-42B5-8137-9DF3F51BA10A}">
+      <p15:sldGuideLst xmlns:p15="http://schemas.microsoft.com/office/powerpoint/2012/main"/>
+    </p:ext>
+  </p:extLst>
 </p:presentation>
 </file>
 
@@ -3534,7 +3539,7 @@
             <a:pPr algn="l" rtl="0"/>
             <a:r>
               <a:rPr lang="en-US" sz="3200" dirty="0"/>
-              <a:t>Server side and API</a:t>
+              <a:t>Server side, API and Security</a:t>
             </a:r>
           </a:p>
           <a:p>
@@ -3547,7 +3552,7 @@
             <a:pPr algn="l" rtl="0"/>
             <a:r>
               <a:rPr lang="en-US" sz="3200" dirty="0"/>
-              <a:t>Client side and Security</a:t>
+              <a:t>Client side and Web Site</a:t>
             </a:r>
           </a:p>
           <a:p>

</xml_diff>

<commit_message>
correcting the syntax in the INTRO slides
</commit_message>
<xml_diff>
--- a/Project Submission/Presentation/INTRO slides.pptx
+++ b/Project Submission/Presentation/INTRO slides.pptx
@@ -260,7 +260,7 @@
           <a:p>
             <a:fld id="{1164EBA9-AB74-4552-B95B-0F2085F16843}" type="datetimeFigureOut">
               <a:rPr lang="he-IL" smtClean="0"/>
-              <a:t>כ"ד/תמוז/תשע"ט</a:t>
+              <a:t>כ"ה/תמוז/תשע"ט</a:t>
             </a:fld>
             <a:endParaRPr lang="he-IL"/>
           </a:p>
@@ -458,7 +458,7 @@
           <a:p>
             <a:fld id="{1164EBA9-AB74-4552-B95B-0F2085F16843}" type="datetimeFigureOut">
               <a:rPr lang="he-IL" smtClean="0"/>
-              <a:t>כ"ד/תמוז/תשע"ט</a:t>
+              <a:t>כ"ה/תמוז/תשע"ט</a:t>
             </a:fld>
             <a:endParaRPr lang="he-IL"/>
           </a:p>
@@ -666,7 +666,7 @@
           <a:p>
             <a:fld id="{1164EBA9-AB74-4552-B95B-0F2085F16843}" type="datetimeFigureOut">
               <a:rPr lang="he-IL" smtClean="0"/>
-              <a:t>כ"ד/תמוז/תשע"ט</a:t>
+              <a:t>כ"ה/תמוז/תשע"ט</a:t>
             </a:fld>
             <a:endParaRPr lang="he-IL"/>
           </a:p>
@@ -864,7 +864,7 @@
           <a:p>
             <a:fld id="{1164EBA9-AB74-4552-B95B-0F2085F16843}" type="datetimeFigureOut">
               <a:rPr lang="he-IL" smtClean="0"/>
-              <a:t>כ"ד/תמוז/תשע"ט</a:t>
+              <a:t>כ"ה/תמוז/תשע"ט</a:t>
             </a:fld>
             <a:endParaRPr lang="he-IL"/>
           </a:p>
@@ -1139,7 +1139,7 @@
           <a:p>
             <a:fld id="{1164EBA9-AB74-4552-B95B-0F2085F16843}" type="datetimeFigureOut">
               <a:rPr lang="he-IL" smtClean="0"/>
-              <a:t>כ"ד/תמוז/תשע"ט</a:t>
+              <a:t>כ"ה/תמוז/תשע"ט</a:t>
             </a:fld>
             <a:endParaRPr lang="he-IL"/>
           </a:p>
@@ -1404,7 +1404,7 @@
           <a:p>
             <a:fld id="{1164EBA9-AB74-4552-B95B-0F2085F16843}" type="datetimeFigureOut">
               <a:rPr lang="he-IL" smtClean="0"/>
-              <a:t>כ"ד/תמוז/תשע"ט</a:t>
+              <a:t>כ"ה/תמוז/תשע"ט</a:t>
             </a:fld>
             <a:endParaRPr lang="he-IL"/>
           </a:p>
@@ -1816,7 +1816,7 @@
           <a:p>
             <a:fld id="{1164EBA9-AB74-4552-B95B-0F2085F16843}" type="datetimeFigureOut">
               <a:rPr lang="he-IL" smtClean="0"/>
-              <a:t>כ"ד/תמוז/תשע"ט</a:t>
+              <a:t>כ"ה/תמוז/תשע"ט</a:t>
             </a:fld>
             <a:endParaRPr lang="he-IL"/>
           </a:p>
@@ -1957,7 +1957,7 @@
           <a:p>
             <a:fld id="{1164EBA9-AB74-4552-B95B-0F2085F16843}" type="datetimeFigureOut">
               <a:rPr lang="he-IL" smtClean="0"/>
-              <a:t>כ"ד/תמוז/תשע"ט</a:t>
+              <a:t>כ"ה/תמוז/תשע"ט</a:t>
             </a:fld>
             <a:endParaRPr lang="he-IL"/>
           </a:p>
@@ -2070,7 +2070,7 @@
           <a:p>
             <a:fld id="{1164EBA9-AB74-4552-B95B-0F2085F16843}" type="datetimeFigureOut">
               <a:rPr lang="he-IL" smtClean="0"/>
-              <a:t>כ"ד/תמוז/תשע"ט</a:t>
+              <a:t>כ"ה/תמוז/תשע"ט</a:t>
             </a:fld>
             <a:endParaRPr lang="he-IL"/>
           </a:p>
@@ -2381,7 +2381,7 @@
           <a:p>
             <a:fld id="{1164EBA9-AB74-4552-B95B-0F2085F16843}" type="datetimeFigureOut">
               <a:rPr lang="he-IL" smtClean="0"/>
-              <a:t>כ"ד/תמוז/תשע"ט</a:t>
+              <a:t>כ"ה/תמוז/תשע"ט</a:t>
             </a:fld>
             <a:endParaRPr lang="he-IL"/>
           </a:p>
@@ -2669,7 +2669,7 @@
           <a:p>
             <a:fld id="{1164EBA9-AB74-4552-B95B-0F2085F16843}" type="datetimeFigureOut">
               <a:rPr lang="he-IL" smtClean="0"/>
-              <a:t>כ"ד/תמוז/תשע"ט</a:t>
+              <a:t>כ"ה/תמוז/תשע"ט</a:t>
             </a:fld>
             <a:endParaRPr lang="he-IL"/>
           </a:p>
@@ -2910,7 +2910,7 @@
           <a:p>
             <a:fld id="{1164EBA9-AB74-4552-B95B-0F2085F16843}" type="datetimeFigureOut">
               <a:rPr lang="he-IL" smtClean="0"/>
-              <a:t>כ"ד/תמוז/תשע"ט</a:t>
+              <a:t>כ"ה/תמוז/תשע"ט</a:t>
             </a:fld>
             <a:endParaRPr lang="he-IL"/>
           </a:p>
@@ -3397,7 +3397,7 @@
             </a:pPr>
             <a:r>
               <a:rPr lang="en-US" sz="3200" dirty="0"/>
-              <a:t>What is the system about?</a:t>
+              <a:t>What is the Smart Switch system?</a:t>
             </a:r>
           </a:p>
           <a:p>
@@ -3411,7 +3411,7 @@
             </a:pPr>
             <a:r>
               <a:rPr lang="en-US" sz="3200" dirty="0"/>
-              <a:t>What it gives to the user?</a:t>
+              <a:t>What it gives the user?</a:t>
             </a:r>
           </a:p>
           <a:p>
@@ -3425,7 +3425,7 @@
             </a:pPr>
             <a:r>
               <a:rPr lang="en-US" sz="3200" dirty="0"/>
-              <a:t>What additional options it gives?</a:t>
+              <a:t>What additional options are given to the user?</a:t>
             </a:r>
             <a:endParaRPr lang="he-IL" sz="3200" dirty="0"/>
           </a:p>
@@ -3565,7 +3565,7 @@
             <a:pPr algn="l" rtl="0"/>
             <a:r>
               <a:rPr lang="en-US" sz="3200" dirty="0"/>
-              <a:t>Demo show for the system</a:t>
+              <a:t>System Demo view</a:t>
             </a:r>
           </a:p>
           <a:p>

</xml_diff>